<commit_message>
added diagrams to readme
</commit_message>
<xml_diff>
--- a/documents/architecture/architecture.pptx
+++ b/documents/architecture/architecture.pptx
@@ -263,7 +263,7 @@
           <a:p>
             <a:fld id="{EDFBD211-52FF-48A4-9406-F4BEE37141E9}" type="datetimeFigureOut">
               <a:rPr lang="en-GB" smtClean="0"/>
-              <a:t>04/08/2020</a:t>
+              <a:t>20/08/2020</a:t>
             </a:fld>
             <a:endParaRPr lang="en-GB"/>
           </a:p>
@@ -463,7 +463,7 @@
           <a:p>
             <a:fld id="{EDFBD211-52FF-48A4-9406-F4BEE37141E9}" type="datetimeFigureOut">
               <a:rPr lang="en-GB" smtClean="0"/>
-              <a:t>04/08/2020</a:t>
+              <a:t>20/08/2020</a:t>
             </a:fld>
             <a:endParaRPr lang="en-GB"/>
           </a:p>
@@ -673,7 +673,7 @@
           <a:p>
             <a:fld id="{EDFBD211-52FF-48A4-9406-F4BEE37141E9}" type="datetimeFigureOut">
               <a:rPr lang="en-GB" smtClean="0"/>
-              <a:t>04/08/2020</a:t>
+              <a:t>20/08/2020</a:t>
             </a:fld>
             <a:endParaRPr lang="en-GB"/>
           </a:p>
@@ -873,7 +873,7 @@
           <a:p>
             <a:fld id="{EDFBD211-52FF-48A4-9406-F4BEE37141E9}" type="datetimeFigureOut">
               <a:rPr lang="en-GB" smtClean="0"/>
-              <a:t>04/08/2020</a:t>
+              <a:t>20/08/2020</a:t>
             </a:fld>
             <a:endParaRPr lang="en-GB"/>
           </a:p>
@@ -1149,7 +1149,7 @@
           <a:p>
             <a:fld id="{EDFBD211-52FF-48A4-9406-F4BEE37141E9}" type="datetimeFigureOut">
               <a:rPr lang="en-GB" smtClean="0"/>
-              <a:t>04/08/2020</a:t>
+              <a:t>20/08/2020</a:t>
             </a:fld>
             <a:endParaRPr lang="en-GB"/>
           </a:p>
@@ -1417,7 +1417,7 @@
           <a:p>
             <a:fld id="{EDFBD211-52FF-48A4-9406-F4BEE37141E9}" type="datetimeFigureOut">
               <a:rPr lang="en-GB" smtClean="0"/>
-              <a:t>04/08/2020</a:t>
+              <a:t>20/08/2020</a:t>
             </a:fld>
             <a:endParaRPr lang="en-GB"/>
           </a:p>
@@ -1832,7 +1832,7 @@
           <a:p>
             <a:fld id="{EDFBD211-52FF-48A4-9406-F4BEE37141E9}" type="datetimeFigureOut">
               <a:rPr lang="en-GB" smtClean="0"/>
-              <a:t>04/08/2020</a:t>
+              <a:t>20/08/2020</a:t>
             </a:fld>
             <a:endParaRPr lang="en-GB"/>
           </a:p>
@@ -1974,7 +1974,7 @@
           <a:p>
             <a:fld id="{EDFBD211-52FF-48A4-9406-F4BEE37141E9}" type="datetimeFigureOut">
               <a:rPr lang="en-GB" smtClean="0"/>
-              <a:t>04/08/2020</a:t>
+              <a:t>20/08/2020</a:t>
             </a:fld>
             <a:endParaRPr lang="en-GB"/>
           </a:p>
@@ -2087,7 +2087,7 @@
           <a:p>
             <a:fld id="{EDFBD211-52FF-48A4-9406-F4BEE37141E9}" type="datetimeFigureOut">
               <a:rPr lang="en-GB" smtClean="0"/>
-              <a:t>04/08/2020</a:t>
+              <a:t>20/08/2020</a:t>
             </a:fld>
             <a:endParaRPr lang="en-GB"/>
           </a:p>
@@ -2400,7 +2400,7 @@
           <a:p>
             <a:fld id="{EDFBD211-52FF-48A4-9406-F4BEE37141E9}" type="datetimeFigureOut">
               <a:rPr lang="en-GB" smtClean="0"/>
-              <a:t>04/08/2020</a:t>
+              <a:t>20/08/2020</a:t>
             </a:fld>
             <a:endParaRPr lang="en-GB"/>
           </a:p>
@@ -2689,7 +2689,7 @@
           <a:p>
             <a:fld id="{EDFBD211-52FF-48A4-9406-F4BEE37141E9}" type="datetimeFigureOut">
               <a:rPr lang="en-GB" smtClean="0"/>
-              <a:t>04/08/2020</a:t>
+              <a:t>20/08/2020</a:t>
             </a:fld>
             <a:endParaRPr lang="en-GB"/>
           </a:p>
@@ -2932,7 +2932,7 @@
           <a:p>
             <a:fld id="{EDFBD211-52FF-48A4-9406-F4BEE37141E9}" type="datetimeFigureOut">
               <a:rPr lang="en-GB" smtClean="0"/>
-              <a:t>04/08/2020</a:t>
+              <a:t>20/08/2020</a:t>
             </a:fld>
             <a:endParaRPr lang="en-GB"/>
           </a:p>
@@ -4922,7 +4922,7 @@
                   <a:schemeClr val="tx1"/>
                 </a:solidFill>
               </a:rPr>
-              <a:t>2</a:t>
+              <a:t>3</a:t>
             </a:r>
           </a:p>
         </p:txBody>
@@ -5040,7 +5040,7 @@
                   <a:schemeClr val="tx1"/>
                 </a:solidFill>
               </a:rPr>
-              <a:t>3</a:t>
+              <a:t>4</a:t>
             </a:r>
           </a:p>
         </p:txBody>
@@ -5099,7 +5099,7 @@
                   <a:schemeClr val="tx1"/>
                 </a:solidFill>
               </a:rPr>
-              <a:t>4</a:t>
+              <a:t>5</a:t>
             </a:r>
           </a:p>
         </p:txBody>
@@ -5158,7 +5158,253 @@
                   <a:schemeClr val="tx1"/>
                 </a:solidFill>
               </a:rPr>
-              <a:t>5</a:t>
+              <a:t>6</a:t>
+            </a:r>
+          </a:p>
+        </p:txBody>
+      </p:sp>
+      <p:grpSp>
+        <p:nvGrpSpPr>
+          <p:cNvPr id="53" name="Group 52">
+            <a:extLst>
+              <a:ext uri="{FF2B5EF4-FFF2-40B4-BE49-F238E27FC236}">
+                <a16:creationId xmlns:a16="http://schemas.microsoft.com/office/drawing/2014/main" id="{0BEB389A-E763-420C-97A1-587BF44F2CD2}"/>
+              </a:ext>
+            </a:extLst>
+          </p:cNvPr>
+          <p:cNvGrpSpPr/>
+          <p:nvPr/>
+        </p:nvGrpSpPr>
+        <p:grpSpPr>
+          <a:xfrm>
+            <a:off x="3120580" y="4131522"/>
+            <a:ext cx="698369" cy="737235"/>
+            <a:chOff x="4951389" y="2809157"/>
+            <a:chExt cx="1406653" cy="1574977"/>
+          </a:xfrm>
+        </p:grpSpPr>
+        <p:pic>
+          <p:nvPicPr>
+            <p:cNvPr id="57" name="Picture 56" descr="A picture containing drawing&#10;&#10;Description automatically generated">
+              <a:extLst>
+                <a:ext uri="{FF2B5EF4-FFF2-40B4-BE49-F238E27FC236}">
+                  <a16:creationId xmlns:a16="http://schemas.microsoft.com/office/drawing/2014/main" id="{44F2B7C1-D612-45AA-880B-604AD8BFFE4E}"/>
+                </a:ext>
+              </a:extLst>
+            </p:cNvPr>
+            <p:cNvPicPr>
+              <a:picLocks noChangeAspect="1"/>
+            </p:cNvPicPr>
+            <p:nvPr/>
+          </p:nvPicPr>
+          <p:blipFill rotWithShape="1">
+            <a:blip r:embed="rId8">
+              <a:clrChange>
+                <a:clrFrom>
+                  <a:srgbClr val="FFFFFF"/>
+                </a:clrFrom>
+                <a:clrTo>
+                  <a:srgbClr val="FFFFFF">
+                    <a:alpha val="0"/>
+                  </a:srgbClr>
+                </a:clrTo>
+              </a:clrChange>
+              <a:extLst>
+                <a:ext uri="{28A0092B-C50C-407E-A947-70E740481C1C}">
+                  <a14:useLocalDpi xmlns:a14="http://schemas.microsoft.com/office/drawing/2010/main" val="0"/>
+                </a:ext>
+              </a:extLst>
+            </a:blip>
+            <a:srcRect l="26232" r="25405"/>
+            <a:stretch/>
+          </p:blipFill>
+          <p:spPr>
+            <a:xfrm>
+              <a:off x="5071108" y="2809157"/>
+              <a:ext cx="1286934" cy="1396999"/>
+            </a:xfrm>
+            <a:prstGeom prst="rect">
+              <a:avLst/>
+            </a:prstGeom>
+          </p:spPr>
+        </p:pic>
+        <p:sp>
+          <p:nvSpPr>
+            <p:cNvPr id="58" name="TextBox 57">
+              <a:extLst>
+                <a:ext uri="{FF2B5EF4-FFF2-40B4-BE49-F238E27FC236}">
+                  <a16:creationId xmlns:a16="http://schemas.microsoft.com/office/drawing/2014/main" id="{CD77BE46-9B1F-40EA-9562-47AFE4E3C850}"/>
+                </a:ext>
+              </a:extLst>
+            </p:cNvPr>
+            <p:cNvSpPr txBox="1"/>
+            <p:nvPr/>
+          </p:nvSpPr>
+          <p:spPr>
+            <a:xfrm>
+              <a:off x="4951389" y="3952682"/>
+              <a:ext cx="1362035" cy="431452"/>
+            </a:xfrm>
+            <a:prstGeom prst="rect">
+              <a:avLst/>
+            </a:prstGeom>
+            <a:noFill/>
+          </p:spPr>
+          <p:txBody>
+            <a:bodyPr wrap="none" rtlCol="0">
+              <a:spAutoFit/>
+            </a:bodyPr>
+            <a:lstStyle/>
+            <a:p>
+              <a:r>
+                <a:rPr lang="en-GB" sz="1050" dirty="0"/>
+                <a:t>DynamoDB</a:t>
+              </a:r>
+            </a:p>
+          </p:txBody>
+        </p:sp>
+      </p:grpSp>
+      <p:cxnSp>
+        <p:nvCxnSpPr>
+          <p:cNvPr id="59" name="Straight Arrow Connector 58">
+            <a:extLst>
+              <a:ext uri="{FF2B5EF4-FFF2-40B4-BE49-F238E27FC236}">
+                <a16:creationId xmlns:a16="http://schemas.microsoft.com/office/drawing/2014/main" id="{CB388642-40B2-4787-8CE1-2C740D708EC7}"/>
+              </a:ext>
+            </a:extLst>
+          </p:cNvPr>
+          <p:cNvCxnSpPr>
+            <a:cxnSpLocks/>
+            <a:endCxn id="11" idx="1"/>
+          </p:cNvCxnSpPr>
+          <p:nvPr/>
+        </p:nvCxnSpPr>
+        <p:spPr>
+          <a:xfrm>
+            <a:off x="3848396" y="4564803"/>
+            <a:ext cx="1223645" cy="1"/>
+          </a:xfrm>
+          <a:prstGeom prst="straightConnector1">
+            <a:avLst/>
+          </a:prstGeom>
+          <a:ln>
+            <a:solidFill>
+              <a:schemeClr val="tx1"/>
+            </a:solidFill>
+            <a:tailEnd type="triangle"/>
+          </a:ln>
+        </p:spPr>
+        <p:style>
+          <a:lnRef idx="1">
+            <a:schemeClr val="accent1"/>
+          </a:lnRef>
+          <a:fillRef idx="0">
+            <a:schemeClr val="accent1"/>
+          </a:fillRef>
+          <a:effectRef idx="0">
+            <a:schemeClr val="accent1"/>
+          </a:effectRef>
+          <a:fontRef idx="minor">
+            <a:schemeClr val="tx1"/>
+          </a:fontRef>
+        </p:style>
+      </p:cxnSp>
+      <p:sp>
+        <p:nvSpPr>
+          <p:cNvPr id="2" name="TextBox 1">
+            <a:extLst>
+              <a:ext uri="{FF2B5EF4-FFF2-40B4-BE49-F238E27FC236}">
+                <a16:creationId xmlns:a16="http://schemas.microsoft.com/office/drawing/2014/main" id="{71A5D2B4-4BF8-4373-8D88-BF91F5E9B453}"/>
+              </a:ext>
+            </a:extLst>
+          </p:cNvPr>
+          <p:cNvSpPr txBox="1"/>
+          <p:nvPr/>
+        </p:nvSpPr>
+        <p:spPr>
+          <a:xfrm>
+            <a:off x="3829906" y="4068970"/>
+            <a:ext cx="882036" cy="523220"/>
+          </a:xfrm>
+          <a:prstGeom prst="rect">
+            <a:avLst/>
+          </a:prstGeom>
+          <a:noFill/>
+        </p:spPr>
+        <p:txBody>
+          <a:bodyPr wrap="none" rtlCol="0">
+            <a:spAutoFit/>
+          </a:bodyPr>
+          <a:lstStyle/>
+          <a:p>
+            <a:r>
+              <a:rPr lang="en-GB" sz="1400" dirty="0"/>
+              <a:t>test file</a:t>
+            </a:r>
+          </a:p>
+          <a:p>
+            <a:r>
+              <a:rPr lang="en-GB" sz="1400" dirty="0"/>
+              <a:t> locations</a:t>
+            </a:r>
+          </a:p>
+        </p:txBody>
+      </p:sp>
+      <p:sp>
+        <p:nvSpPr>
+          <p:cNvPr id="16" name="Oval 15">
+            <a:extLst>
+              <a:ext uri="{FF2B5EF4-FFF2-40B4-BE49-F238E27FC236}">
+                <a16:creationId xmlns:a16="http://schemas.microsoft.com/office/drawing/2014/main" id="{7FC4AD7F-165F-4A21-8776-0F261B51B82D}"/>
+              </a:ext>
+            </a:extLst>
+          </p:cNvPr>
+          <p:cNvSpPr/>
+          <p:nvPr/>
+        </p:nvSpPr>
+        <p:spPr>
+          <a:xfrm>
+            <a:off x="3533710" y="3883303"/>
+            <a:ext cx="349319" cy="338554"/>
+          </a:xfrm>
+          <a:prstGeom prst="ellipse">
+            <a:avLst/>
+          </a:prstGeom>
+          <a:noFill/>
+          <a:ln>
+            <a:solidFill>
+              <a:schemeClr val="tx1"/>
+            </a:solidFill>
+          </a:ln>
+        </p:spPr>
+        <p:style>
+          <a:lnRef idx="2">
+            <a:schemeClr val="accent1">
+              <a:shade val="50000"/>
+            </a:schemeClr>
+          </a:lnRef>
+          <a:fillRef idx="1">
+            <a:schemeClr val="accent1"/>
+          </a:fillRef>
+          <a:effectRef idx="0">
+            <a:schemeClr val="accent1"/>
+          </a:effectRef>
+          <a:fontRef idx="minor">
+            <a:schemeClr val="lt1"/>
+          </a:fontRef>
+        </p:style>
+        <p:txBody>
+          <a:bodyPr rtlCol="0" anchor="ctr"/>
+          <a:lstStyle/>
+          <a:p>
+            <a:pPr algn="ctr"/>
+            <a:r>
+              <a:rPr lang="en-GB" dirty="0">
+                <a:solidFill>
+                  <a:schemeClr val="tx1"/>
+                </a:solidFill>
+              </a:rPr>
+              <a:t>2</a:t>
             </a:r>
           </a:p>
         </p:txBody>

</xml_diff>